<commit_message>
removed draft version of PowerPoint
</commit_message>
<xml_diff>
--- a/Powerpoint/NBA Attendance Analysis.pptx
+++ b/Powerpoint/NBA Attendance Analysis.pptx
@@ -133,7 +133,7 @@
   <pc:docChgLst>
     <pc:chgData name="Matiullah Hasher" userId="b5da0c13cdb4b27c" providerId="LiveId" clId="{2469DAC8-8C7B-4D21-9881-AF2FB6BAF2F6}"/>
     <pc:docChg chg="custSel addSld delSld modSld">
-      <pc:chgData name="Matiullah Hasher" userId="b5da0c13cdb4b27c" providerId="LiveId" clId="{2469DAC8-8C7B-4D21-9881-AF2FB6BAF2F6}" dt="2018-08-11T02:29:32.428" v="844" actId="27636"/>
+      <pc:chgData name="Matiullah Hasher" userId="b5da0c13cdb4b27c" providerId="LiveId" clId="{2469DAC8-8C7B-4D21-9881-AF2FB6BAF2F6}" dt="2018-08-11T11:06:03.309" v="845"/>
       <pc:docMkLst>
         <pc:docMk/>
       </pc:docMkLst>
@@ -160,8 +160,8 @@
           </ac:spMkLst>
         </pc:spChg>
       </pc:sldChg>
-      <pc:sldChg chg="modSp">
-        <pc:chgData name="Matiullah Hasher" userId="b5da0c13cdb4b27c" providerId="LiveId" clId="{2469DAC8-8C7B-4D21-9881-AF2FB6BAF2F6}" dt="2018-08-11T02:29:08.905" v="839" actId="27636"/>
+      <pc:sldChg chg="modSp delCm">
+        <pc:chgData name="Matiullah Hasher" userId="b5da0c13cdb4b27c" providerId="LiveId" clId="{2469DAC8-8C7B-4D21-9881-AF2FB6BAF2F6}" dt="2018-08-11T11:06:03.309" v="845"/>
         <pc:sldMkLst>
           <pc:docMk/>
           <pc:sldMk cId="3396752082" sldId="260"/>
@@ -319,20 +319,6 @@
     </pc:docChg>
   </pc:docChgLst>
 </pc:chgInfo>
-</file>
-
-<file path=ppt/comments/comment1.xml><?xml version="1.0" encoding="utf-8"?>
-<p:cmLst xmlns:a="http://schemas.openxmlformats.org/drawingml/2006/main" xmlns:r="http://schemas.openxmlformats.org/officeDocument/2006/relationships" xmlns:p="http://schemas.openxmlformats.org/presentationml/2006/main">
-  <p:cm authorId="1" dt="2018-08-09T04:43:53.880" idx="1">
-    <p:pos x="10" y="10"/>
-    <p:text/>
-    <p:extLst>
-      <p:ext uri="{C676402C-5697-4E1C-873F-D02D1690AC5C}">
-        <p15:threadingInfo xmlns:p15="http://schemas.microsoft.com/office/powerpoint/2012/main" timeZoneBias="240"/>
-      </p:ext>
-    </p:extLst>
-  </p:cm>
-</p:cmLst>
 </file>
 
 <file path=ppt/diagrams/colors1.xml><?xml version="1.0" encoding="utf-8"?>
@@ -5458,7 +5444,7 @@
           <a:p>
             <a:fld id="{ECFE6AF2-E251-4549-B07F-CA0BEB1B74A4}" type="datetimeFigureOut">
               <a:rPr lang="en-US" smtClean="0"/>
-              <a:t>8/10/2018</a:t>
+              <a:t>8/11/2018</a:t>
             </a:fld>
             <a:endParaRPr lang="en-US"/>
           </a:p>
@@ -5745,7 +5731,7 @@
           <a:p>
             <a:fld id="{ECFE6AF2-E251-4549-B07F-CA0BEB1B74A4}" type="datetimeFigureOut">
               <a:rPr lang="en-US" smtClean="0"/>
-              <a:t>8/10/2018</a:t>
+              <a:t>8/11/2018</a:t>
             </a:fld>
             <a:endParaRPr lang="en-US"/>
           </a:p>
@@ -5937,7 +5923,7 @@
           <a:p>
             <a:fld id="{ECFE6AF2-E251-4549-B07F-CA0BEB1B74A4}" type="datetimeFigureOut">
               <a:rPr lang="en-US" smtClean="0"/>
-              <a:t>8/10/2018</a:t>
+              <a:t>8/11/2018</a:t>
             </a:fld>
             <a:endParaRPr lang="en-US"/>
           </a:p>
@@ -6198,7 +6184,7 @@
           <a:p>
             <a:fld id="{ECFE6AF2-E251-4549-B07F-CA0BEB1B74A4}" type="datetimeFigureOut">
               <a:rPr lang="en-US" smtClean="0"/>
-              <a:t>8/10/2018</a:t>
+              <a:t>8/11/2018</a:t>
             </a:fld>
             <a:endParaRPr lang="en-US"/>
           </a:p>
@@ -6622,7 +6608,7 @@
           <a:p>
             <a:fld id="{ECFE6AF2-E251-4549-B07F-CA0BEB1B74A4}" type="datetimeFigureOut">
               <a:rPr lang="en-US" smtClean="0"/>
-              <a:t>8/10/2018</a:t>
+              <a:t>8/11/2018</a:t>
             </a:fld>
             <a:endParaRPr lang="en-US"/>
           </a:p>
@@ -7168,7 +7154,7 @@
           <a:p>
             <a:fld id="{ECFE6AF2-E251-4549-B07F-CA0BEB1B74A4}" type="datetimeFigureOut">
               <a:rPr lang="en-US" smtClean="0"/>
-              <a:t>8/10/2018</a:t>
+              <a:t>8/11/2018</a:t>
             </a:fld>
             <a:endParaRPr lang="en-US"/>
           </a:p>
@@ -8008,7 +7994,7 @@
           <a:p>
             <a:fld id="{ECFE6AF2-E251-4549-B07F-CA0BEB1B74A4}" type="datetimeFigureOut">
               <a:rPr lang="en-US" smtClean="0"/>
-              <a:t>8/10/2018</a:t>
+              <a:t>8/11/2018</a:t>
             </a:fld>
             <a:endParaRPr lang="en-US"/>
           </a:p>
@@ -8178,7 +8164,7 @@
           <a:p>
             <a:fld id="{ECFE6AF2-E251-4549-B07F-CA0BEB1B74A4}" type="datetimeFigureOut">
               <a:rPr lang="en-US" smtClean="0"/>
-              <a:t>8/10/2018</a:t>
+              <a:t>8/11/2018</a:t>
             </a:fld>
             <a:endParaRPr lang="en-US"/>
           </a:p>
@@ -8362,7 +8348,7 @@
           <a:p>
             <a:fld id="{ECFE6AF2-E251-4549-B07F-CA0BEB1B74A4}" type="datetimeFigureOut">
               <a:rPr lang="en-US" smtClean="0"/>
-              <a:t>8/10/2018</a:t>
+              <a:t>8/11/2018</a:t>
             </a:fld>
             <a:endParaRPr lang="en-US"/>
           </a:p>
@@ -8532,7 +8518,7 @@
           <a:p>
             <a:fld id="{ECFE6AF2-E251-4549-B07F-CA0BEB1B74A4}" type="datetimeFigureOut">
               <a:rPr lang="en-US" smtClean="0"/>
-              <a:t>8/10/2018</a:t>
+              <a:t>8/11/2018</a:t>
             </a:fld>
             <a:endParaRPr lang="en-US"/>
           </a:p>
@@ -8780,7 +8766,7 @@
           <a:p>
             <a:fld id="{ECFE6AF2-E251-4549-B07F-CA0BEB1B74A4}" type="datetimeFigureOut">
               <a:rPr lang="en-US" smtClean="0"/>
-              <a:t>8/10/2018</a:t>
+              <a:t>8/11/2018</a:t>
             </a:fld>
             <a:endParaRPr lang="en-US"/>
           </a:p>
@@ -9017,7 +9003,7 @@
           <a:p>
             <a:fld id="{ECFE6AF2-E251-4549-B07F-CA0BEB1B74A4}" type="datetimeFigureOut">
               <a:rPr lang="en-US" smtClean="0"/>
-              <a:t>8/10/2018</a:t>
+              <a:t>8/11/2018</a:t>
             </a:fld>
             <a:endParaRPr lang="en-US"/>
           </a:p>
@@ -9395,7 +9381,7 @@
           <a:p>
             <a:fld id="{ECFE6AF2-E251-4549-B07F-CA0BEB1B74A4}" type="datetimeFigureOut">
               <a:rPr lang="en-US" smtClean="0"/>
-              <a:t>8/10/2018</a:t>
+              <a:t>8/11/2018</a:t>
             </a:fld>
             <a:endParaRPr lang="en-US"/>
           </a:p>
@@ -9518,7 +9504,7 @@
           <a:p>
             <a:fld id="{ECFE6AF2-E251-4549-B07F-CA0BEB1B74A4}" type="datetimeFigureOut">
               <a:rPr lang="en-US" smtClean="0"/>
-              <a:t>8/10/2018</a:t>
+              <a:t>8/11/2018</a:t>
             </a:fld>
             <a:endParaRPr lang="en-US"/>
           </a:p>
@@ -9613,7 +9599,7 @@
           <a:p>
             <a:fld id="{ECFE6AF2-E251-4549-B07F-CA0BEB1B74A4}" type="datetimeFigureOut">
               <a:rPr lang="en-US" smtClean="0"/>
-              <a:t>8/10/2018</a:t>
+              <a:t>8/11/2018</a:t>
             </a:fld>
             <a:endParaRPr lang="en-US"/>
           </a:p>
@@ -9864,7 +9850,7 @@
           <a:p>
             <a:fld id="{ECFE6AF2-E251-4549-B07F-CA0BEB1B74A4}" type="datetimeFigureOut">
               <a:rPr lang="en-US" smtClean="0"/>
-              <a:t>8/10/2018</a:t>
+              <a:t>8/11/2018</a:t>
             </a:fld>
             <a:endParaRPr lang="en-US"/>
           </a:p>
@@ -10156,7 +10142,7 @@
           <a:p>
             <a:fld id="{ECFE6AF2-E251-4549-B07F-CA0BEB1B74A4}" type="datetimeFigureOut">
               <a:rPr lang="en-US" smtClean="0"/>
-              <a:t>8/10/2018</a:t>
+              <a:t>8/11/2018</a:t>
             </a:fld>
             <a:endParaRPr lang="en-US"/>
           </a:p>
@@ -10369,7 +10355,7 @@
           <a:p>
             <a:fld id="{ECFE6AF2-E251-4549-B07F-CA0BEB1B74A4}" type="datetimeFigureOut">
               <a:rPr lang="en-US" smtClean="0"/>
-              <a:t>8/10/2018</a:t>
+              <a:t>8/11/2018</a:t>
             </a:fld>
             <a:endParaRPr lang="en-US"/>
           </a:p>
@@ -10906,13 +10892,8 @@
           <a:p>
             <a:r>
               <a:rPr lang="en-US" dirty="0"/>
-              <a:t>Matiullah Hasher &amp; JT von </a:t>
+              <a:t>Matiullah Hasher &amp; JT von Seggern</a:t>
             </a:r>
-            <a:r>
-              <a:rPr lang="en-US" dirty="0" err="1"/>
-              <a:t>Seggern</a:t>
-            </a:r>
-            <a:endParaRPr lang="en-US" dirty="0"/>
           </a:p>
           <a:p>
             <a:endParaRPr lang="en-US" dirty="0"/>

</xml_diff>